<commit_message>
Added slide for Shawn Wildermuth's Pluralsight course
</commit_message>
<xml_diff>
--- a/Bell_ASPConnections_AJS322_NetToJS .pptx
+++ b/Bell_ASPConnections_AJS322_NetToJS .pptx
@@ -5,10 +5,10 @@
     <p:sldMasterId id="2147483648" r:id="rId1"/>
   </p:sldMasterIdLst>
   <p:notesMasterIdLst>
-    <p:notesMasterId r:id="rId43"/>
+    <p:notesMasterId r:id="rId44"/>
   </p:notesMasterIdLst>
   <p:handoutMasterIdLst>
-    <p:handoutMasterId r:id="rId44"/>
+    <p:handoutMasterId r:id="rId45"/>
   </p:handoutMasterIdLst>
   <p:sldIdLst>
     <p:sldId id="259" r:id="rId2"/>
@@ -51,7 +51,8 @@
     <p:sldId id="287" r:id="rId39"/>
     <p:sldId id="298" r:id="rId40"/>
     <p:sldId id="260" r:id="rId41"/>
-    <p:sldId id="258" r:id="rId42"/>
+    <p:sldId id="300" r:id="rId42"/>
+    <p:sldId id="258" r:id="rId43"/>
   </p:sldIdLst>
   <p:sldSz cx="9144000" cy="5143500" type="screen16x9"/>
   <p:notesSz cx="6858000" cy="9144000"/>
@@ -1110,7 +1111,7 @@
             <a:fld id="{676EAB40-3BED-4879-909B-D791B02DA3CD}" type="slidenum">
               <a:rPr lang="en-US" smtClean="0"/>
               <a:pPr/>
-              <a:t>41</a:t>
+              <a:t>42</a:t>
             </a:fld>
             <a:endParaRPr lang="en-US" smtClean="0"/>
           </a:p>
@@ -8394,21 +8395,7 @@
                 <a:latin typeface="Consolas" pitchFamily="49" charset="0"/>
                 <a:cs typeface="Consolas" pitchFamily="49" charset="0"/>
               </a:rPr>
-              <a:t> || </a:t>
-            </a:r>
-            <a:r>
-              <a:rPr lang="en-US" sz="2400" dirty="0" smtClean="0">
-                <a:latin typeface="Consolas" pitchFamily="49" charset="0"/>
-                <a:cs typeface="Consolas" pitchFamily="49" charset="0"/>
-              </a:rPr>
-              <a:t>{}; </a:t>
-            </a:r>
-            <a:r>
-              <a:rPr lang="en-US" sz="2400" dirty="0" smtClean="0">
-                <a:latin typeface="Consolas" pitchFamily="49" charset="0"/>
-                <a:cs typeface="Consolas" pitchFamily="49" charset="0"/>
-              </a:rPr>
-              <a:t>// idiomatic abuse of OR</a:t>
+              <a:t> || {}; // idiomatic abuse of OR</a:t>
             </a:r>
             <a:endParaRPr lang="en-US" sz="2400" dirty="0">
               <a:latin typeface="Consolas" pitchFamily="49" charset="0"/>
@@ -13608,6 +13595,216 @@
 </file>
 
 <file path=ppt/slides/slide41.xml><?xml version="1.0" encoding="utf-8"?>
+<p:sld xmlns:a="http://schemas.openxmlformats.org/drawingml/2006/main" xmlns:r="http://schemas.openxmlformats.org/officeDocument/2006/relationships" xmlns:p="http://schemas.openxmlformats.org/presentationml/2006/main">
+  <p:cSld>
+    <p:spTree>
+      <p:nvGrpSpPr>
+        <p:cNvPr id="1" name=""/>
+        <p:cNvGrpSpPr/>
+        <p:nvPr/>
+      </p:nvGrpSpPr>
+      <p:grpSpPr>
+        <a:xfrm>
+          <a:off x="0" y="0"/>
+          <a:ext cx="0" cy="0"/>
+          <a:chOff x="0" y="0"/>
+          <a:chExt cx="0" cy="0"/>
+        </a:xfrm>
+      </p:grpSpPr>
+      <p:sp>
+        <p:nvSpPr>
+          <p:cNvPr id="2" name="Title 1"/>
+          <p:cNvSpPr>
+            <a:spLocks noGrp="1"/>
+          </p:cNvSpPr>
+          <p:nvPr>
+            <p:ph type="title"/>
+          </p:nvPr>
+        </p:nvSpPr>
+        <p:spPr/>
+        <p:txBody>
+          <a:bodyPr/>
+          <a:lstStyle/>
+          <a:p>
+            <a:r>
+              <a:rPr lang="en-US" dirty="0">
+                <a:hlinkClick r:id="rId2"/>
+              </a:rPr>
+              <a:t>JavaScript for C# Developers </a:t>
+            </a:r>
+            <a:endParaRPr lang="en-US" dirty="0"/>
+          </a:p>
+        </p:txBody>
+      </p:sp>
+      <p:sp>
+        <p:nvSpPr>
+          <p:cNvPr id="3" name="Content Placeholder 2"/>
+          <p:cNvSpPr>
+            <a:spLocks noGrp="1"/>
+          </p:cNvSpPr>
+          <p:nvPr>
+            <p:ph idx="1"/>
+          </p:nvPr>
+        </p:nvSpPr>
+        <p:spPr>
+          <a:xfrm>
+            <a:off x="457200" y="1200151"/>
+            <a:ext cx="8229600" cy="2971799"/>
+          </a:xfrm>
+        </p:spPr>
+        <p:txBody>
+          <a:bodyPr/>
+          <a:lstStyle/>
+          <a:p>
+            <a:pPr marL="0" indent="0">
+              <a:buNone/>
+            </a:pPr>
+            <a:r>
+              <a:rPr lang="en-US" dirty="0" err="1" smtClean="0"/>
+              <a:t>PluralSight</a:t>
+            </a:r>
+            <a:r>
+              <a:rPr lang="en-US" dirty="0" smtClean="0"/>
+              <a:t> course by Shawn </a:t>
+            </a:r>
+            <a:r>
+              <a:rPr lang="en-US" dirty="0" err="1" smtClean="0"/>
+              <a:t>Wildermuth</a:t>
+            </a:r>
+            <a:endParaRPr lang="en-US" dirty="0" smtClean="0"/>
+          </a:p>
+          <a:p>
+            <a:pPr marL="457200" lvl="1" indent="0">
+              <a:buNone/>
+            </a:pPr>
+            <a:r>
+              <a:rPr lang="en-US" sz="2400" dirty="0"/>
+              <a:t>Comparing C# and JavaScript</a:t>
+            </a:r>
+          </a:p>
+          <a:p>
+            <a:pPr marL="457200" lvl="1" indent="0">
+              <a:buNone/>
+            </a:pPr>
+            <a:r>
+              <a:rPr lang="en-US" sz="2400" dirty="0"/>
+              <a:t>Why </a:t>
+            </a:r>
+            <a:r>
+              <a:rPr lang="en-US" sz="2400" dirty="0" smtClean="0"/>
+              <a:t>functions </a:t>
+            </a:r>
+            <a:r>
+              <a:rPr lang="en-US" sz="2400" dirty="0"/>
+              <a:t>are </a:t>
+            </a:r>
+            <a:r>
+              <a:rPr lang="en-US" sz="2400" dirty="0" smtClean="0"/>
+              <a:t>different </a:t>
+            </a:r>
+            <a:r>
+              <a:rPr lang="en-US" sz="2400" dirty="0"/>
+              <a:t>than </a:t>
+            </a:r>
+            <a:r>
+              <a:rPr lang="en-US" sz="2400" dirty="0" smtClean="0"/>
+              <a:t>methods</a:t>
+            </a:r>
+            <a:endParaRPr lang="en-US" sz="2400" dirty="0"/>
+          </a:p>
+          <a:p>
+            <a:pPr marL="457200" lvl="1" indent="0">
+              <a:buNone/>
+            </a:pPr>
+            <a:r>
+              <a:rPr lang="en-US" sz="2400" dirty="0" smtClean="0"/>
+              <a:t>Object-oriented </a:t>
+            </a:r>
+            <a:r>
+              <a:rPr lang="en-US" sz="2400" dirty="0"/>
+              <a:t>JavaScript</a:t>
+            </a:r>
+          </a:p>
+          <a:p>
+            <a:pPr marL="457200" lvl="1" indent="0">
+              <a:buNone/>
+            </a:pPr>
+            <a:r>
+              <a:rPr lang="en-US" sz="2400" dirty="0"/>
+              <a:t>Architecting JavaScript </a:t>
+            </a:r>
+            <a:r>
+              <a:rPr lang="en-US" sz="2400" dirty="0" smtClean="0"/>
+              <a:t>code</a:t>
+            </a:r>
+            <a:endParaRPr lang="en-US" sz="2400" dirty="0"/>
+          </a:p>
+          <a:p>
+            <a:pPr marL="457200" lvl="1" indent="0">
+              <a:buNone/>
+            </a:pPr>
+            <a:r>
+              <a:rPr lang="en-US" sz="2400" dirty="0" smtClean="0"/>
+              <a:t>And more…</a:t>
+            </a:r>
+            <a:endParaRPr lang="en-US" sz="2400" dirty="0"/>
+          </a:p>
+        </p:txBody>
+      </p:sp>
+      <p:sp>
+        <p:nvSpPr>
+          <p:cNvPr id="4" name="TextBox 3"/>
+          <p:cNvSpPr txBox="1"/>
+          <p:nvPr/>
+        </p:nvSpPr>
+        <p:spPr>
+          <a:xfrm>
+            <a:off x="457200" y="4400550"/>
+            <a:ext cx="5029200" cy="338554"/>
+          </a:xfrm>
+          <a:prstGeom prst="rect">
+            <a:avLst/>
+          </a:prstGeom>
+          <a:noFill/>
+        </p:spPr>
+        <p:txBody>
+          <a:bodyPr wrap="square" rtlCol="0">
+            <a:spAutoFit/>
+          </a:bodyPr>
+          <a:lstStyle/>
+          <a:p>
+            <a:pPr marL="0" lvl="1"/>
+            <a:r>
+              <a:rPr lang="en-US" sz="1600" dirty="0" smtClean="0">
+                <a:hlinkClick r:id="rId2"/>
+              </a:rPr>
+              <a:t>http://shawnw.me/js4cscourse</a:t>
+            </a:r>
+            <a:endParaRPr lang="en-US" sz="1600" dirty="0"/>
+          </a:p>
+        </p:txBody>
+      </p:sp>
+    </p:spTree>
+    <p:extLst>
+      <p:ext uri="{BB962C8B-B14F-4D97-AF65-F5344CB8AC3E}">
+        <p14:creationId xmlns:p14="http://schemas.microsoft.com/office/powerpoint/2010/main" val="3267400684"/>
+      </p:ext>
+    </p:extLst>
+  </p:cSld>
+  <p:clrMapOvr>
+    <a:masterClrMapping/>
+  </p:clrMapOvr>
+  <p:timing>
+    <p:tnLst>
+      <p:par>
+        <p:cTn id="1" dur="indefinite" restart="never" nodeType="tmRoot"/>
+      </p:par>
+    </p:tnLst>
+  </p:timing>
+</p:sld>
+</file>
+
+<file path=ppt/slides/slide42.xml><?xml version="1.0" encoding="utf-8"?>
 <p:sld xmlns:a="http://schemas.openxmlformats.org/drawingml/2006/main" xmlns:r="http://schemas.openxmlformats.org/officeDocument/2006/relationships" xmlns:p="http://schemas.openxmlformats.org/presentationml/2006/main">
   <p:cSld>
     <p:bg>

</xml_diff>